<commit_message>
Revert "echt helemaal af"
This reverts commit 7422be80cb408ba57d8a70474921a35eac055a1c.

# Conflicts:
#	admin/boekopvraag.php
</commit_message>
<xml_diff>
--- a/Opleveren/Sprint 3 presentatie.pptx
+++ b/Opleveren/Sprint 3 presentatie.pptx
@@ -8,10 +8,9 @@
     <p:sldId id="256" r:id="rId2"/>
     <p:sldId id="257" r:id="rId3"/>
     <p:sldId id="258" r:id="rId4"/>
-    <p:sldId id="259" r:id="rId5"/>
-    <p:sldId id="262" r:id="rId6"/>
-    <p:sldId id="260" r:id="rId7"/>
-    <p:sldId id="261" r:id="rId8"/>
+    <p:sldId id="262" r:id="rId5"/>
+    <p:sldId id="260" r:id="rId6"/>
+    <p:sldId id="261" r:id="rId7"/>
   </p:sldIdLst>
   <p:sldSz cx="12192000" cy="6858000"/>
   <p:notesSz cx="6858000" cy="9144000"/>
@@ -110,6 +109,11 @@
       </a:defRPr>
     </a:lvl9pPr>
   </p:defaultTextStyle>
+  <p:extLst>
+    <p:ext uri="{EFAFB233-063F-42B5-8137-9DF3F51BA10A}">
+      <p15:sldGuideLst xmlns:p15="http://schemas.microsoft.com/office/powerpoint/2012/main"/>
+    </p:ext>
+  </p:extLst>
 </p:presentation>
 </file>
 
@@ -7811,20 +7815,17 @@
           <a:p>
             <a:r>
               <a:rPr lang="nl-NL" dirty="0"/>
-              <a:t>Documentatie</a:t>
+              <a:t>Demo</a:t>
             </a:r>
           </a:p>
           <a:p>
             <a:r>
               <a:rPr lang="nl-NL" dirty="0"/>
-              <a:t>Demo</a:t>
-            </a:r>
-          </a:p>
-          <a:p>
-            <a:r>
-              <a:rPr lang="nl-NL" dirty="0"/>
-              <a:t> </a:t>
-            </a:r>
+              <a:t> Documentatie</a:t>
+            </a:r>
+          </a:p>
+          <a:p>
+            <a:endParaRPr lang="nl-NL" dirty="0"/>
           </a:p>
         </p:txBody>
       </p:sp>
@@ -7875,7 +7876,7 @@
           <a:p>
             <a:r>
               <a:rPr lang="nl-NL" dirty="0"/>
-              <a:t>Doelstelling sprint 3</a:t>
+              <a:t>Doelstellingen en afgerond</a:t>
             </a:r>
           </a:p>
         </p:txBody>
@@ -7909,7 +7910,7 @@
           <a:p>
             <a:r>
               <a:rPr lang="nl-NL" dirty="0"/>
-              <a:t>Foutloos product opleveren</a:t>
+              <a:t>Volledig werkend product opleveren</a:t>
             </a:r>
           </a:p>
           <a:p>
@@ -7964,7 +7965,7 @@
           <a:p>
             <a:r>
               <a:rPr lang="nl-NL" dirty="0"/>
-              <a:t>Afgerond deze sprint</a:t>
+              <a:t>Documentatie</a:t>
             </a:r>
           </a:p>
         </p:txBody>
@@ -7984,14 +7985,32 @@
           <a:bodyPr/>
           <a:lstStyle/>
           <a:p>
-            <a:endParaRPr lang="nl-NL"/>
+            <a:r>
+              <a:rPr lang="nl-NL" dirty="0"/>
+              <a:t>Bedrijfsvoering</a:t>
+            </a:r>
+          </a:p>
+          <a:p>
+            <a:r>
+              <a:rPr lang="nl-NL" dirty="0"/>
+              <a:t>Ingebouwd veiligheidsniveau</a:t>
+            </a:r>
+          </a:p>
+          <a:p>
+            <a:r>
+              <a:rPr lang="nl-NL" dirty="0"/>
+              <a:t>Advies vervolgstappen</a:t>
+            </a:r>
+          </a:p>
+          <a:p>
+            <a:endParaRPr lang="nl-NL" dirty="0"/>
           </a:p>
         </p:txBody>
       </p:sp>
     </p:spTree>
     <p:extLst>
       <p:ext uri="{BB962C8B-B14F-4D97-AF65-F5344CB8AC3E}">
-        <p14:creationId xmlns:p14="http://schemas.microsoft.com/office/powerpoint/2010/main" val="2674640491"/>
+        <p14:creationId xmlns:p14="http://schemas.microsoft.com/office/powerpoint/2010/main" val="2525288973"/>
       </p:ext>
     </p:extLst>
   </p:cSld>
@@ -8035,7 +8054,7 @@
           <a:p>
             <a:r>
               <a:rPr lang="nl-NL" dirty="0"/>
-              <a:t>Documentatie</a:t>
+              <a:t>Demonstratie</a:t>
             </a:r>
           </a:p>
         </p:txBody>
@@ -8052,108 +8071,60 @@
         </p:nvSpPr>
         <p:spPr/>
         <p:txBody>
-          <a:bodyPr/>
+          <a:bodyPr>
+            <a:normAutofit/>
+          </a:bodyPr>
           <a:lstStyle/>
           <a:p>
             <a:r>
               <a:rPr lang="nl-NL" dirty="0"/>
-              <a:t>Bedrijfsvoering</a:t>
+              <a:t>USE CASE Administrator</a:t>
             </a:r>
           </a:p>
           <a:p>
             <a:r>
               <a:rPr lang="nl-NL" dirty="0"/>
-              <a:t>Ingebouwd veiligheidsniveau</a:t>
+              <a:t>Agenda inplannen</a:t>
             </a:r>
           </a:p>
           <a:p>
             <a:r>
               <a:rPr lang="nl-NL" dirty="0"/>
-              <a:t>Advies vervolgstappen</a:t>
-            </a:r>
-          </a:p>
-          <a:p>
+              <a:t>Status van boekingen wijzigen</a:t>
+            </a:r>
+          </a:p>
+          <a:p>
+            <a:r>
+              <a:rPr lang="nl-NL" dirty="0"/>
+              <a:t>Boekingsgegevens opvragen</a:t>
+            </a:r>
+          </a:p>
+          <a:p>
+            <a:pPr marL="0" indent="0">
+              <a:buNone/>
+            </a:pPr>
             <a:endParaRPr lang="nl-NL" dirty="0"/>
           </a:p>
-        </p:txBody>
-      </p:sp>
-    </p:spTree>
-    <p:extLst>
-      <p:ext uri="{BB962C8B-B14F-4D97-AF65-F5344CB8AC3E}">
-        <p14:creationId xmlns:p14="http://schemas.microsoft.com/office/powerpoint/2010/main" val="2525288973"/>
-      </p:ext>
-    </p:extLst>
-  </p:cSld>
-  <p:clrMapOvr>
-    <a:masterClrMapping/>
-  </p:clrMapOvr>
-</p:sld>
-</file>
-
-<file path=ppt/slides/slide6.xml><?xml version="1.0" encoding="utf-8"?>
-<p:sld xmlns:a="http://schemas.openxmlformats.org/drawingml/2006/main" xmlns:r="http://schemas.openxmlformats.org/officeDocument/2006/relationships" xmlns:p="http://schemas.openxmlformats.org/presentationml/2006/main">
-  <p:cSld>
-    <p:spTree>
-      <p:nvGrpSpPr>
-        <p:cNvPr id="1" name=""/>
-        <p:cNvGrpSpPr/>
-        <p:nvPr/>
-      </p:nvGrpSpPr>
-      <p:grpSpPr>
-        <a:xfrm>
-          <a:off x="0" y="0"/>
-          <a:ext cx="0" cy="0"/>
-          <a:chOff x="0" y="0"/>
-          <a:chExt cx="0" cy="0"/>
-        </a:xfrm>
-      </p:grpSpPr>
-      <p:sp>
-        <p:nvSpPr>
-          <p:cNvPr id="2" name="Title 1"/>
-          <p:cNvSpPr>
-            <a:spLocks noGrp="1"/>
-          </p:cNvSpPr>
-          <p:nvPr>
-            <p:ph type="title"/>
-          </p:nvPr>
-        </p:nvSpPr>
-        <p:spPr/>
-        <p:txBody>
-          <a:bodyPr/>
-          <a:lstStyle/>
           <a:p>
             <a:r>
               <a:rPr lang="nl-NL" dirty="0"/>
-              <a:t>Demonstratie</a:t>
-            </a:r>
-          </a:p>
-        </p:txBody>
-      </p:sp>
-      <p:sp>
-        <p:nvSpPr>
-          <p:cNvPr id="3" name="Content Placeholder 2"/>
-          <p:cNvSpPr>
-            <a:spLocks noGrp="1"/>
-          </p:cNvSpPr>
-          <p:nvPr>
-            <p:ph idx="1"/>
-          </p:nvPr>
-        </p:nvSpPr>
-        <p:spPr/>
-        <p:txBody>
-          <a:bodyPr/>
-          <a:lstStyle/>
+              <a:t>USE CASE Gast/klant</a:t>
+            </a:r>
+          </a:p>
           <a:p>
             <a:r>
               <a:rPr lang="nl-NL" dirty="0"/>
-              <a:t>USE CASES</a:t>
+              <a:t>Wisselen van taal</a:t>
             </a:r>
           </a:p>
           <a:p>
             <a:r>
               <a:rPr lang="nl-NL" dirty="0"/>
-              <a:t>Agenda</a:t>
-            </a:r>
+              <a:t>Bevestigingsmail boeking</a:t>
+            </a:r>
+          </a:p>
+          <a:p>
+            <a:endParaRPr lang="nl-NL" dirty="0"/>
           </a:p>
           <a:p>
             <a:endParaRPr lang="nl-NL" dirty="0"/>
@@ -8173,7 +8144,7 @@
 </p:sld>
 </file>
 
-<file path=ppt/slides/slide7.xml><?xml version="1.0" encoding="utf-8"?>
+<file path=ppt/slides/slide6.xml><?xml version="1.0" encoding="utf-8"?>
 <p:sld xmlns:a="http://schemas.openxmlformats.org/drawingml/2006/main" xmlns:r="http://schemas.openxmlformats.org/officeDocument/2006/relationships" xmlns:p="http://schemas.openxmlformats.org/presentationml/2006/main">
   <p:cSld>
     <p:spTree>

</xml_diff>